<commit_message>
mis à jour partie interface du powerpoint
</commit_message>
<xml_diff>
--- a/Documents/PowerPoint/DiapoPhase1.pptx
+++ b/Documents/PowerPoint/DiapoPhase1.pptx
@@ -5551,7 +5551,7 @@
             <a:pPr algn="r" rtl="0"/>
             <a:fld id="{85FB9A08-40BC-47B5-8130-616BDCF09507}" type="datetime1">
               <a:rPr lang="fr-FR" smtClean="0"/>
-              <a:t>12/12/2017</a:t>
+              <a:t>13/12/2017</a:t>
             </a:fld>
             <a:endParaRPr lang="fr-FR" dirty="0"/>
           </a:p>
@@ -5721,7 +5721,7 @@
             <a:fld id="{082B9BC8-1895-4EB7-B2E1-D3911C69AD0C}" type="datetime1">
               <a:rPr lang="fr-FR" smtClean="0"/>
               <a:pPr/>
-              <a:t>12/12/2017</a:t>
+              <a:t>13/12/2017</a:t>
             </a:fld>
             <a:endParaRPr lang="fr-FR" dirty="0"/>
           </a:p>
@@ -6380,7 +6380,7 @@
             <a:fld id="{B0AE1499-D871-4B5A-815F-37F8E0C46F8C}" type="datetime1">
               <a:rPr lang="fr-FR" smtClean="0"/>
               <a:pPr/>
-              <a:t>12/12/2017</a:t>
+              <a:t>13/12/2017</a:t>
             </a:fld>
             <a:endParaRPr lang="fr-FR" dirty="0"/>
           </a:p>
@@ -6587,7 +6587,7 @@
             <a:fld id="{7CFD53AE-A1A9-4971-B817-D6F393C7FE35}" type="datetime1">
               <a:rPr lang="fr-FR" smtClean="0"/>
               <a:pPr/>
-              <a:t>12/12/2017</a:t>
+              <a:t>13/12/2017</a:t>
             </a:fld>
             <a:endParaRPr lang="fr-FR" dirty="0"/>
           </a:p>
@@ -6788,7 +6788,7 @@
             <a:fld id="{B4EA85BC-BD2B-458E-8340-8D31B4F152AE}" type="datetime1">
               <a:rPr lang="fr-FR" smtClean="0"/>
               <a:pPr/>
-              <a:t>12/12/2017</a:t>
+              <a:t>13/12/2017</a:t>
             </a:fld>
             <a:endParaRPr lang="fr-FR" dirty="0"/>
           </a:p>
@@ -7266,7 +7266,7 @@
             <a:fld id="{2C9DB741-A3C2-4C75-A4D1-97F129BE9491}" type="datetime1">
               <a:rPr lang="fr-FR" smtClean="0"/>
               <a:pPr/>
-              <a:t>12/12/2017</a:t>
+              <a:t>13/12/2017</a:t>
             </a:fld>
             <a:endParaRPr lang="fr-FR" dirty="0"/>
           </a:p>
@@ -7733,7 +7733,7 @@
             <a:fld id="{11B59C61-65A8-4FB6-8060-9ACE25B631CB}" type="datetime1">
               <a:rPr lang="fr-FR" noProof="0" smtClean="0"/>
               <a:pPr/>
-              <a:t>12/12/2017</a:t>
+              <a:t>13/12/2017</a:t>
             </a:fld>
             <a:endParaRPr lang="fr-FR" noProof="0" dirty="0"/>
           </a:p>
@@ -7878,7 +7878,7 @@
             <a:fld id="{B19C7B91-9FE1-44A2-8FAA-E998ADCC26EE}" type="datetime1">
               <a:rPr lang="fr-FR" smtClean="0"/>
               <a:pPr/>
-              <a:t>12/12/2017</a:t>
+              <a:t>13/12/2017</a:t>
             </a:fld>
             <a:endParaRPr lang="fr-FR" dirty="0"/>
           </a:p>
@@ -7999,7 +7999,7 @@
             <a:fld id="{24294901-3B67-4101-8D94-E7F6C7A7004D}" type="datetime1">
               <a:rPr lang="fr-FR" smtClean="0"/>
               <a:pPr/>
-              <a:t>12/12/2017</a:t>
+              <a:t>13/12/2017</a:t>
             </a:fld>
             <a:endParaRPr lang="fr-FR" dirty="0"/>
           </a:p>
@@ -8310,7 +8310,7 @@
             <a:fld id="{36311718-BEC8-4DB8-9B0A-52986EABC5C9}" type="datetime1">
               <a:rPr lang="fr-FR" smtClean="0"/>
               <a:pPr/>
-              <a:t>12/12/2017</a:t>
+              <a:t>13/12/2017</a:t>
             </a:fld>
             <a:endParaRPr lang="fr-FR" dirty="0"/>
           </a:p>
@@ -8651,7 +8651,7 @@
             <a:fld id="{E883871E-5D80-4EDF-9E01-94E184402302}" type="datetime1">
               <a:rPr lang="fr-FR" smtClean="0"/>
               <a:pPr/>
-              <a:t>12/12/2017</a:t>
+              <a:t>13/12/2017</a:t>
             </a:fld>
             <a:endParaRPr lang="fr-FR" dirty="0"/>
           </a:p>
@@ -8887,7 +8887,7 @@
             <a:fld id="{A9F01D7A-F2CA-4D89-BC48-D8C829AA64E1}" type="datetime1">
               <a:rPr lang="fr-FR" smtClean="0"/>
               <a:pPr/>
-              <a:t>12/12/2017</a:t>
+              <a:t>13/12/2017</a:t>
             </a:fld>
             <a:endParaRPr lang="fr-FR" dirty="0"/>
           </a:p>
@@ -9634,6 +9634,99 @@
           </a:prstGeom>
         </p:spPr>
       </p:pic>
+      <p:sp>
+        <p:nvSpPr>
+          <p:cNvPr id="4" name="Titre 1"/>
+          <p:cNvSpPr txBox="1">
+            <a:spLocks/>
+          </p:cNvSpPr>
+          <p:nvPr/>
+        </p:nvSpPr>
+        <p:spPr>
+          <a:xfrm>
+            <a:off x="-855154" y="125640"/>
+            <a:ext cx="6660232" cy="1143000"/>
+          </a:xfrm>
+          <a:prstGeom prst="rect">
+            <a:avLst/>
+          </a:prstGeom>
+        </p:spPr>
+        <p:txBody>
+          <a:bodyPr vert="horz" lIns="91440" tIns="45720" rIns="91440" bIns="45720" rtlCol="0" anchor="b">
+            <a:normAutofit/>
+          </a:bodyPr>
+          <a:lstStyle>
+            <a:lvl1pPr algn="l" defTabSz="914400" rtl="0" eaLnBrk="1" latinLnBrk="0" hangingPunct="1">
+              <a:lnSpc>
+                <a:spcPct val="90000"/>
+              </a:lnSpc>
+              <a:spcBef>
+                <a:spcPct val="0"/>
+              </a:spcBef>
+              <a:buNone/>
+              <a:defRPr sz="3400" kern="1200">
+                <a:solidFill>
+                  <a:schemeClr val="accent1"/>
+                </a:solidFill>
+                <a:latin typeface="+mj-lt"/>
+                <a:ea typeface="+mj-ea"/>
+                <a:cs typeface="+mj-cs"/>
+              </a:defRPr>
+            </a:lvl1pPr>
+          </a:lstStyle>
+          <a:p>
+            <a:pPr algn="ctr"/>
+            <a:r>
+              <a:rPr lang="fr-FR" dirty="0" smtClean="0"/>
+              <a:t>Interface</a:t>
+            </a:r>
+            <a:endParaRPr lang="fr-FR" dirty="0"/>
+          </a:p>
+        </p:txBody>
+      </p:sp>
+      <p:sp>
+        <p:nvSpPr>
+          <p:cNvPr id="5" name="ZoneTexte 4"/>
+          <p:cNvSpPr txBox="1"/>
+          <p:nvPr/>
+        </p:nvSpPr>
+        <p:spPr>
+          <a:xfrm>
+            <a:off x="2494012" y="1431491"/>
+            <a:ext cx="5026361" cy="461665"/>
+          </a:xfrm>
+          <a:prstGeom prst="rect">
+            <a:avLst/>
+          </a:prstGeom>
+          <a:noFill/>
+        </p:spPr>
+        <p:txBody>
+          <a:bodyPr wrap="square" rtlCol="0">
+            <a:spAutoFit/>
+          </a:bodyPr>
+          <a:lstStyle/>
+          <a:p>
+            <a:pPr algn="ctr"/>
+            <a:r>
+              <a:rPr lang="fr-FR" sz="2400" smtClean="0">
+                <a:solidFill>
+                  <a:schemeClr val="accent1">
+                    <a:lumMod val="50000"/>
+                  </a:schemeClr>
+                </a:solidFill>
+              </a:rPr>
+              <a:t>L’utilisation</a:t>
+            </a:r>
+            <a:endParaRPr lang="fr-FR" sz="2400" dirty="0">
+              <a:solidFill>
+                <a:schemeClr val="accent1">
+                  <a:lumMod val="50000"/>
+                </a:schemeClr>
+              </a:solidFill>
+            </a:endParaRPr>
+          </a:p>
+        </p:txBody>
+      </p:sp>
     </p:spTree>
     <p:extLst>
       <p:ext uri="{BB962C8B-B14F-4D97-AF65-F5344CB8AC3E}">
@@ -9813,11 +9906,7 @@
             <a:pPr rtl="0"/>
             <a:r>
               <a:rPr lang="fr-FR" dirty="0" smtClean="0"/>
-              <a:t>Théorie </a:t>
-            </a:r>
-            <a:r>
-              <a:rPr lang="fr-FR" dirty="0" smtClean="0"/>
-              <a:t>SOM</a:t>
+              <a:t>Théorie SOM</a:t>
             </a:r>
           </a:p>
           <a:p>
@@ -9826,7 +9915,6 @@
               <a:rPr lang="fr-FR" dirty="0" smtClean="0"/>
               <a:t>CUDA</a:t>
             </a:r>
-            <a:endParaRPr lang="fr-FR" dirty="0" smtClean="0"/>
           </a:p>
           <a:p>
             <a:pPr rtl="0"/>
@@ -9852,7 +9940,6 @@
               <a:rPr lang="fr-FR" dirty="0"/>
               <a:t>2</a:t>
             </a:r>
-            <a:endParaRPr lang="fr-FR" dirty="0"/>
           </a:p>
         </p:txBody>
       </p:sp>
@@ -12478,15 +12565,6 @@
 </file>
 
 <file path=customXml/item1.xml><?xml version="1.0" encoding="utf-8"?>
-<?mso-contentType ?>
-<FormTemplates xmlns="http://schemas.microsoft.com/sharepoint/v3/contenttype/forms">
-  <Display>DocumentLibraryForm</Display>
-  <Edit>AssetEditForm</Edit>
-  <New>DocumentLibraryForm</New>
-</FormTemplates>
-</file>
-
-<file path=customXml/item2.xml><?xml version="1.0" encoding="utf-8"?>
 <p:properties xmlns:p="http://schemas.microsoft.com/office/2006/metadata/properties" xmlns:xsi="http://www.w3.org/2001/XMLSchema-instance" xmlns:pc="http://schemas.microsoft.com/office/infopath/2007/PartnerControls">
   <documentManagement>
     <DirectSourceMarket xmlns="4873beb7-5857-4685-be1f-d57550cc96cc" xsi:nil="true"/>
@@ -12610,6 +12688,15 @@
     <LocMarketGroupTiers2 xmlns="4873beb7-5857-4685-be1f-d57550cc96cc" xsi:nil="true"/>
   </documentManagement>
 </p:properties>
+</file>
+
+<file path=customXml/item2.xml><?xml version="1.0" encoding="utf-8"?>
+<?mso-contentType ?>
+<FormTemplates xmlns="http://schemas.microsoft.com/sharepoint/v3/contenttype/forms">
+  <Display>DocumentLibraryForm</Display>
+  <Edit>AssetEditForm</Edit>
+  <New>DocumentLibraryForm</New>
+</FormTemplates>
 </file>
 
 <file path=customXml/item3.xml><?xml version="1.0" encoding="utf-8"?>
@@ -13653,19 +13740,19 @@
 </file>
 
 <file path=customXml/itemProps1.xml><?xml version="1.0" encoding="utf-8"?>
-<ds:datastoreItem xmlns:ds="http://schemas.openxmlformats.org/officeDocument/2006/customXml" ds:itemID="{746CFF6F-D9AA-4BC0-911A-0A1356771912}">
+<ds:datastoreItem xmlns:ds="http://schemas.openxmlformats.org/officeDocument/2006/customXml" ds:itemID="{04098515-0C12-46CF-BC7C-69B4A13CD5FA}">
   <ds:schemaRefs>
-    <ds:schemaRef ds:uri="http://schemas.microsoft.com/sharepoint/v3/contenttype/forms"/>
+    <ds:schemaRef ds:uri="http://schemas.microsoft.com/office/2006/metadata/properties"/>
+    <ds:schemaRef ds:uri="http://schemas.microsoft.com/office/infopath/2007/PartnerControls"/>
+    <ds:schemaRef ds:uri="4873beb7-5857-4685-be1f-d57550cc96cc"/>
   </ds:schemaRefs>
 </ds:datastoreItem>
 </file>
 
 <file path=customXml/itemProps2.xml><?xml version="1.0" encoding="utf-8"?>
-<ds:datastoreItem xmlns:ds="http://schemas.openxmlformats.org/officeDocument/2006/customXml" ds:itemID="{04098515-0C12-46CF-BC7C-69B4A13CD5FA}">
+<ds:datastoreItem xmlns:ds="http://schemas.openxmlformats.org/officeDocument/2006/customXml" ds:itemID="{746CFF6F-D9AA-4BC0-911A-0A1356771912}">
   <ds:schemaRefs>
-    <ds:schemaRef ds:uri="http://schemas.microsoft.com/office/2006/metadata/properties"/>
-    <ds:schemaRef ds:uri="http://schemas.microsoft.com/office/infopath/2007/PartnerControls"/>
-    <ds:schemaRef ds:uri="4873beb7-5857-4685-be1f-d57550cc96cc"/>
+    <ds:schemaRef ds:uri="http://schemas.microsoft.com/sharepoint/v3/contenttype/forms"/>
   </ds:schemaRefs>
 </ds:datastoreItem>
 </file>

</xml_diff>

<commit_message>
avancée sur le power point su cuda
</commit_message>
<xml_diff>
--- a/Documents/PowerPoint/DiapoPhase1.pptx
+++ b/Documents/PowerPoint/DiapoPhase1.pptx
@@ -5,10 +5,10 @@
     <p:sldMasterId id="2147483648" r:id="rId4"/>
   </p:sldMasterIdLst>
   <p:notesMasterIdLst>
-    <p:notesMasterId r:id="rId17"/>
+    <p:notesMasterId r:id="rId18"/>
   </p:notesMasterIdLst>
   <p:handoutMasterIdLst>
-    <p:handoutMasterId r:id="rId18"/>
+    <p:handoutMasterId r:id="rId19"/>
   </p:handoutMasterIdLst>
   <p:sldIdLst>
     <p:sldId id="256" r:id="rId5"/>
@@ -21,8 +21,9 @@
     <p:sldId id="282" r:id="rId12"/>
     <p:sldId id="281" r:id="rId13"/>
     <p:sldId id="280" r:id="rId14"/>
-    <p:sldId id="284" r:id="rId15"/>
-    <p:sldId id="277" r:id="rId16"/>
+    <p:sldId id="286" r:id="rId15"/>
+    <p:sldId id="284" r:id="rId16"/>
+    <p:sldId id="277" r:id="rId17"/>
   </p:sldIdLst>
   <p:sldSz cx="12192000" cy="6858000"/>
   <p:notesSz cx="6858000" cy="9144000"/>
@@ -9547,6 +9548,128 @@
           </a:p>
         </p:txBody>
       </p:sp>
+      <p:pic>
+        <p:nvPicPr>
+          <p:cNvPr id="4" name="Image 3"/>
+          <p:cNvPicPr>
+            <a:picLocks noChangeAspect="1"/>
+          </p:cNvPicPr>
+          <p:nvPr/>
+        </p:nvPicPr>
+        <p:blipFill>
+          <a:blip r:embed="rId3" cstate="print">
+            <a:extLst>
+              <a:ext uri="{28A0092B-C50C-407E-A947-70E740481C1C}">
+                <a14:useLocalDpi xmlns:a14="http://schemas.microsoft.com/office/drawing/2010/main" val="0"/>
+              </a:ext>
+            </a:extLst>
+          </a:blip>
+          <a:stretch>
+            <a:fillRect/>
+          </a:stretch>
+        </p:blipFill>
+        <p:spPr>
+          <a:xfrm>
+            <a:off x="3143672" y="1916832"/>
+            <a:ext cx="2438400" cy="1956816"/>
+          </a:xfrm>
+          <a:prstGeom prst="rect">
+            <a:avLst/>
+          </a:prstGeom>
+        </p:spPr>
+      </p:pic>
+      <p:pic>
+        <p:nvPicPr>
+          <p:cNvPr id="5" name="Image 4"/>
+          <p:cNvPicPr>
+            <a:picLocks noChangeAspect="1"/>
+          </p:cNvPicPr>
+          <p:nvPr/>
+        </p:nvPicPr>
+        <p:blipFill>
+          <a:blip r:embed="rId4">
+            <a:extLst>
+              <a:ext uri="{28A0092B-C50C-407E-A947-70E740481C1C}">
+                <a14:useLocalDpi xmlns:a14="http://schemas.microsoft.com/office/drawing/2010/main" val="0"/>
+              </a:ext>
+            </a:extLst>
+          </a:blip>
+          <a:stretch>
+            <a:fillRect/>
+          </a:stretch>
+        </p:blipFill>
+        <p:spPr>
+          <a:xfrm>
+            <a:off x="8832304" y="1916832"/>
+            <a:ext cx="2232248" cy="1811069"/>
+          </a:xfrm>
+          <a:prstGeom prst="rect">
+            <a:avLst/>
+          </a:prstGeom>
+        </p:spPr>
+      </p:pic>
+      <p:sp>
+        <p:nvSpPr>
+          <p:cNvPr id="6" name="ZoneTexte 5"/>
+          <p:cNvSpPr txBox="1"/>
+          <p:nvPr/>
+        </p:nvSpPr>
+        <p:spPr>
+          <a:xfrm>
+            <a:off x="3175640" y="4005614"/>
+            <a:ext cx="8496944" cy="369332"/>
+          </a:xfrm>
+          <a:prstGeom prst="rect">
+            <a:avLst/>
+          </a:prstGeom>
+          <a:noFill/>
+        </p:spPr>
+        <p:txBody>
+          <a:bodyPr wrap="square" rtlCol="0">
+            <a:spAutoFit/>
+          </a:bodyPr>
+          <a:lstStyle/>
+          <a:p>
+            <a:r>
+              <a:rPr lang="fr-FR" i="1" dirty="0" smtClean="0">
+                <a:solidFill>
+                  <a:schemeClr val="bg1"/>
+                </a:solidFill>
+              </a:rPr>
+              <a:t>Host</a:t>
+            </a:r>
+            <a:r>
+              <a:rPr lang="fr-FR" dirty="0" smtClean="0">
+                <a:solidFill>
+                  <a:schemeClr val="bg1"/>
+                </a:solidFill>
+              </a:rPr>
+              <a:t> : CPU et sa mémoire 				</a:t>
+            </a:r>
+            <a:r>
+              <a:rPr lang="fr-FR" i="1" dirty="0" err="1" smtClean="0">
+                <a:solidFill>
+                  <a:schemeClr val="bg1"/>
+                </a:solidFill>
+              </a:rPr>
+              <a:t>Device</a:t>
+            </a:r>
+            <a:r>
+              <a:rPr lang="fr-FR" dirty="0" smtClean="0">
+                <a:solidFill>
+                  <a:schemeClr val="bg1"/>
+                </a:solidFill>
+              </a:rPr>
+              <a:t> : GPU et sa mémoire</a:t>
+            </a:r>
+            <a:endParaRPr lang="fr-FR" dirty="0">
+              <a:solidFill>
+                <a:schemeClr val="bg1"/>
+              </a:solidFill>
+            </a:endParaRPr>
+          </a:p>
+        </p:txBody>
+      </p:sp>
     </p:spTree>
     <p:extLst>
       <p:ext uri="{BB962C8B-B14F-4D97-AF65-F5344CB8AC3E}">
@@ -9569,6 +9692,104 @@
 </file>
 
 <file path=ppt/slides/slide11.xml><?xml version="1.0" encoding="utf-8"?>
+<p:sld xmlns:a="http://schemas.openxmlformats.org/drawingml/2006/main" xmlns:r="http://schemas.openxmlformats.org/officeDocument/2006/relationships" xmlns:p="http://schemas.openxmlformats.org/presentationml/2006/main">
+  <p:cSld>
+    <p:spTree>
+      <p:nvGrpSpPr>
+        <p:cNvPr id="1" name=""/>
+        <p:cNvGrpSpPr/>
+        <p:nvPr/>
+      </p:nvGrpSpPr>
+      <p:grpSpPr>
+        <a:xfrm>
+          <a:off x="0" y="0"/>
+          <a:ext cx="0" cy="0"/>
+          <a:chOff x="0" y="0"/>
+          <a:chExt cx="0" cy="0"/>
+        </a:xfrm>
+      </p:grpSpPr>
+      <p:pic>
+        <p:nvPicPr>
+          <p:cNvPr id="3" name="Image 2"/>
+          <p:cNvPicPr>
+            <a:picLocks noChangeAspect="1"/>
+          </p:cNvPicPr>
+          <p:nvPr/>
+        </p:nvPicPr>
+        <p:blipFill>
+          <a:blip r:embed="rId2">
+            <a:extLst>
+              <a:ext uri="{28A0092B-C50C-407E-A947-70E740481C1C}">
+                <a14:useLocalDpi xmlns:a14="http://schemas.microsoft.com/office/drawing/2010/main" val="0"/>
+              </a:ext>
+            </a:extLst>
+          </a:blip>
+          <a:stretch>
+            <a:fillRect/>
+          </a:stretch>
+        </p:blipFill>
+        <p:spPr>
+          <a:xfrm>
+            <a:off x="762" y="428"/>
+            <a:ext cx="12190476" cy="6857143"/>
+          </a:xfrm>
+          <a:prstGeom prst="rect">
+            <a:avLst/>
+          </a:prstGeom>
+        </p:spPr>
+      </p:pic>
+      <p:pic>
+        <p:nvPicPr>
+          <p:cNvPr id="7" name="Image 6"/>
+          <p:cNvPicPr>
+            <a:picLocks noChangeAspect="1"/>
+          </p:cNvPicPr>
+          <p:nvPr/>
+        </p:nvPicPr>
+        <p:blipFill>
+          <a:blip r:embed="rId3">
+            <a:extLst>
+              <a:ext uri="{28A0092B-C50C-407E-A947-70E740481C1C}">
+                <a14:useLocalDpi xmlns:a14="http://schemas.microsoft.com/office/drawing/2010/main" val="0"/>
+              </a:ext>
+            </a:extLst>
+          </a:blip>
+          <a:stretch>
+            <a:fillRect/>
+          </a:stretch>
+        </p:blipFill>
+        <p:spPr>
+          <a:xfrm>
+            <a:off x="2675621" y="332656"/>
+            <a:ext cx="9397043" cy="6264696"/>
+          </a:xfrm>
+          <a:prstGeom prst="rect">
+            <a:avLst/>
+          </a:prstGeom>
+        </p:spPr>
+      </p:pic>
+    </p:spTree>
+    <p:extLst>
+      <p:ext uri="{BB962C8B-B14F-4D97-AF65-F5344CB8AC3E}">
+        <p14:creationId xmlns:p14="http://schemas.microsoft.com/office/powerpoint/2010/main" val="2853413406"/>
+      </p:ext>
+    </p:extLst>
+  </p:cSld>
+  <p:clrMapOvr>
+    <a:masterClrMapping/>
+  </p:clrMapOvr>
+  <mc:AlternateContent xmlns:mc="http://schemas.openxmlformats.org/markup-compatibility/2006" xmlns:p14="http://schemas.microsoft.com/office/powerpoint/2010/main">
+    <mc:Choice Requires="p14">
+      <p:transition spd="slow" p14:dur="2000"/>
+    </mc:Choice>
+    <mc:Fallback xmlns="">
+      <p:transition spd="slow"/>
+    </mc:Fallback>
+  </mc:AlternateContent>
+</p:sld>
+</file>
+
+<file path=ppt/slides/slide12.xml><?xml version="1.0" encoding="utf-8"?>
 <p:sld xmlns:a="http://schemas.openxmlformats.org/drawingml/2006/main" xmlns:r="http://schemas.openxmlformats.org/officeDocument/2006/relationships" xmlns:p="http://schemas.openxmlformats.org/presentationml/2006/main">
   <p:cSld>
     <p:spTree>
@@ -9748,7 +9969,7 @@
 </p:sld>
 </file>
 
-<file path=ppt/slides/slide12.xml><?xml version="1.0" encoding="utf-8"?>
+<file path=ppt/slides/slide13.xml><?xml version="1.0" encoding="utf-8"?>
 <p:sld xmlns:a="http://schemas.openxmlformats.org/drawingml/2006/main" xmlns:r="http://schemas.openxmlformats.org/officeDocument/2006/relationships" xmlns:p="http://schemas.openxmlformats.org/presentationml/2006/main">
   <p:cSld>
     <p:spTree>
@@ -12691,15 +12912,6 @@
 </file>
 
 <file path=customXml/item2.xml><?xml version="1.0" encoding="utf-8"?>
-<?mso-contentType ?>
-<FormTemplates xmlns="http://schemas.microsoft.com/sharepoint/v3/contenttype/forms">
-  <Display>DocumentLibraryForm</Display>
-  <Edit>AssetEditForm</Edit>
-  <New>DocumentLibraryForm</New>
-</FormTemplates>
-</file>
-
-<file path=customXml/item3.xml><?xml version="1.0" encoding="utf-8"?>
 <ct:contentTypeSchema xmlns:ct="http://schemas.microsoft.com/office/2006/metadata/contentType" xmlns:ma="http://schemas.microsoft.com/office/2006/metadata/properties/metaAttributes" ct:_="" ma:_="" ma:contentTypeName="TemplateFile" ma:contentTypeID="0x0101006EDDDB5EE6D98C44930B742096920B300400F5B6D36B3EF94B4E9A635CDF2A18F5B8" ma:contentTypeVersion="72" ma:contentTypeDescription="Create a new document." ma:contentTypeScope="" ma:versionID="a23e56308344d904b51738559c3d67c9">
   <xsd:schema xmlns:xsd="http://www.w3.org/2001/XMLSchema" xmlns:xs="http://www.w3.org/2001/XMLSchema" xmlns:p="http://schemas.microsoft.com/office/2006/metadata/properties" xmlns:ns2="4873beb7-5857-4685-be1f-d57550cc96cc" targetNamespace="http://schemas.microsoft.com/office/2006/metadata/properties" ma:root="true" ma:fieldsID="cd0908cc4600e77bf5da051303e00c8d" ns2:_="">
     <xsd:import namespace="4873beb7-5857-4685-be1f-d57550cc96cc"/>
@@ -13739,6 +13951,15 @@
 </ct:contentTypeSchema>
 </file>
 
+<file path=customXml/item3.xml><?xml version="1.0" encoding="utf-8"?>
+<?mso-contentType ?>
+<FormTemplates xmlns="http://schemas.microsoft.com/sharepoint/v3/contenttype/forms">
+  <Display>DocumentLibraryForm</Display>
+  <Edit>AssetEditForm</Edit>
+  <New>DocumentLibraryForm</New>
+</FormTemplates>
+</file>
+
 <file path=customXml/itemProps1.xml><?xml version="1.0" encoding="utf-8"?>
 <ds:datastoreItem xmlns:ds="http://schemas.openxmlformats.org/officeDocument/2006/customXml" ds:itemID="{04098515-0C12-46CF-BC7C-69B4A13CD5FA}">
   <ds:schemaRefs>
@@ -13750,14 +13971,6 @@
 </file>
 
 <file path=customXml/itemProps2.xml><?xml version="1.0" encoding="utf-8"?>
-<ds:datastoreItem xmlns:ds="http://schemas.openxmlformats.org/officeDocument/2006/customXml" ds:itemID="{746CFF6F-D9AA-4BC0-911A-0A1356771912}">
-  <ds:schemaRefs>
-    <ds:schemaRef ds:uri="http://schemas.microsoft.com/sharepoint/v3/contenttype/forms"/>
-  </ds:schemaRefs>
-</ds:datastoreItem>
-</file>
-
-<file path=customXml/itemProps3.xml><?xml version="1.0" encoding="utf-8"?>
 <ds:datastoreItem xmlns:ds="http://schemas.openxmlformats.org/officeDocument/2006/customXml" ds:itemID="{0B5C6E15-39DC-470B-9445-F754B9458020}">
   <ds:schemaRefs>
     <ds:schemaRef ds:uri="http://schemas.microsoft.com/office/2006/metadata/contentType"/>
@@ -13773,4 +13986,12 @@
     <ds:schemaRef ds:uri="http://schemas.microsoft.com/internal/obd"/>
   </ds:schemaRefs>
 </ds:datastoreItem>
+</file>
+
+<file path=customXml/itemProps3.xml><?xml version="1.0" encoding="utf-8"?>
+<ds:datastoreItem xmlns:ds="http://schemas.openxmlformats.org/officeDocument/2006/customXml" ds:itemID="{746CFF6F-D9AA-4BC0-911A-0A1356771912}">
+  <ds:schemaRefs>
+    <ds:schemaRef ds:uri="http://schemas.microsoft.com/sharepoint/v3/contenttype/forms"/>
+  </ds:schemaRefs>
+</ds:datastoreItem>
 </file>
</xml_diff>